<commit_message>
Ajustes para o SP1
</commit_message>
<xml_diff>
--- a/Documentos/Modelo Canvas do Projeto Aplicado - 2021.pptx
+++ b/Documentos/Modelo Canvas do Projeto Aplicado - 2021.pptx
@@ -700,7 +700,7 @@
           <a:p>
             <a:fld id="{722B080F-126B-4C40-8493-979CF4E35B37}" type="datetimeFigureOut">
               <a:rPr lang="pt-BR" smtClean="0"/>
-              <a:t>04/06/2022</a:t>
+              <a:t>20/06/2022</a:t>
             </a:fld>
             <a:endParaRPr lang="pt-BR"/>
           </a:p>
@@ -898,7 +898,7 @@
           <a:p>
             <a:fld id="{722B080F-126B-4C40-8493-979CF4E35B37}" type="datetimeFigureOut">
               <a:rPr lang="pt-BR" smtClean="0"/>
-              <a:t>04/06/2022</a:t>
+              <a:t>20/06/2022</a:t>
             </a:fld>
             <a:endParaRPr lang="pt-BR"/>
           </a:p>
@@ -1173,7 +1173,7 @@
           <a:p>
             <a:fld id="{722B080F-126B-4C40-8493-979CF4E35B37}" type="datetimeFigureOut">
               <a:rPr lang="pt-BR" smtClean="0"/>
-              <a:t>04/06/2022</a:t>
+              <a:t>20/06/2022</a:t>
             </a:fld>
             <a:endParaRPr lang="pt-BR"/>
           </a:p>
@@ -1438,7 +1438,7 @@
           <a:p>
             <a:fld id="{722B080F-126B-4C40-8493-979CF4E35B37}" type="datetimeFigureOut">
               <a:rPr lang="pt-BR" smtClean="0"/>
-              <a:t>04/06/2022</a:t>
+              <a:t>20/06/2022</a:t>
             </a:fld>
             <a:endParaRPr lang="pt-BR"/>
           </a:p>
@@ -1850,7 +1850,7 @@
           <a:p>
             <a:fld id="{722B080F-126B-4C40-8493-979CF4E35B37}" type="datetimeFigureOut">
               <a:rPr lang="pt-BR" smtClean="0"/>
-              <a:t>04/06/2022</a:t>
+              <a:t>20/06/2022</a:t>
             </a:fld>
             <a:endParaRPr lang="pt-BR"/>
           </a:p>
@@ -1991,7 +1991,7 @@
           <a:p>
             <a:fld id="{722B080F-126B-4C40-8493-979CF4E35B37}" type="datetimeFigureOut">
               <a:rPr lang="pt-BR" smtClean="0"/>
-              <a:t>04/06/2022</a:t>
+              <a:t>20/06/2022</a:t>
             </a:fld>
             <a:endParaRPr lang="pt-BR"/>
           </a:p>
@@ -2104,7 +2104,7 @@
           <a:p>
             <a:fld id="{722B080F-126B-4C40-8493-979CF4E35B37}" type="datetimeFigureOut">
               <a:rPr lang="pt-BR" smtClean="0"/>
-              <a:t>04/06/2022</a:t>
+              <a:t>20/06/2022</a:t>
             </a:fld>
             <a:endParaRPr lang="pt-BR"/>
           </a:p>
@@ -2530,7 +2530,7 @@
           <a:p>
             <a:fld id="{722B080F-126B-4C40-8493-979CF4E35B37}" type="datetimeFigureOut">
               <a:rPr lang="pt-BR" smtClean="0"/>
-              <a:t>04/06/2022</a:t>
+              <a:t>20/06/2022</a:t>
             </a:fld>
             <a:endParaRPr lang="pt-BR"/>
           </a:p>
@@ -2818,7 +2818,7 @@
           <a:p>
             <a:fld id="{722B080F-126B-4C40-8493-979CF4E35B37}" type="datetimeFigureOut">
               <a:rPr lang="pt-BR" smtClean="0"/>
-              <a:t>04/06/2022</a:t>
+              <a:t>20/06/2022</a:t>
             </a:fld>
             <a:endParaRPr lang="pt-BR"/>
           </a:p>
@@ -3016,7 +3016,7 @@
           <a:p>
             <a:fld id="{722B080F-126B-4C40-8493-979CF4E35B37}" type="datetimeFigureOut">
               <a:rPr lang="pt-BR" smtClean="0"/>
-              <a:t>04/06/2022</a:t>
+              <a:t>20/06/2022</a:t>
             </a:fld>
             <a:endParaRPr lang="pt-BR"/>
           </a:p>
@@ -3224,7 +3224,7 @@
           <a:p>
             <a:fld id="{722B080F-126B-4C40-8493-979CF4E35B37}" type="datetimeFigureOut">
               <a:rPr lang="pt-BR" smtClean="0"/>
-              <a:t>04/06/2022</a:t>
+              <a:t>20/06/2022</a:t>
             </a:fld>
             <a:endParaRPr lang="pt-BR"/>
           </a:p>
@@ -3444,7 +3444,7 @@
           <a:p>
             <a:fld id="{E4EBD666-A697-4156-91FF-DAAB2B063E63}" type="datetimeFigureOut">
               <a:rPr lang="pt-BR" smtClean="0"/>
-              <a:t>04/06/2022</a:t>
+              <a:t>20/06/2022</a:t>
             </a:fld>
             <a:endParaRPr lang="pt-BR"/>
           </a:p>
@@ -3642,7 +3642,7 @@
           <a:p>
             <a:fld id="{E4EBD666-A697-4156-91FF-DAAB2B063E63}" type="datetimeFigureOut">
               <a:rPr lang="pt-BR" smtClean="0"/>
-              <a:t>04/06/2022</a:t>
+              <a:t>20/06/2022</a:t>
             </a:fld>
             <a:endParaRPr lang="pt-BR"/>
           </a:p>
@@ -3917,7 +3917,7 @@
           <a:p>
             <a:fld id="{E4EBD666-A697-4156-91FF-DAAB2B063E63}" type="datetimeFigureOut">
               <a:rPr lang="pt-BR" smtClean="0"/>
-              <a:t>04/06/2022</a:t>
+              <a:t>20/06/2022</a:t>
             </a:fld>
             <a:endParaRPr lang="pt-BR"/>
           </a:p>
@@ -4182,7 +4182,7 @@
           <a:p>
             <a:fld id="{E4EBD666-A697-4156-91FF-DAAB2B063E63}" type="datetimeFigureOut">
               <a:rPr lang="pt-BR" smtClean="0"/>
-              <a:t>04/06/2022</a:t>
+              <a:t>20/06/2022</a:t>
             </a:fld>
             <a:endParaRPr lang="pt-BR"/>
           </a:p>
@@ -4594,7 +4594,7 @@
           <a:p>
             <a:fld id="{E4EBD666-A697-4156-91FF-DAAB2B063E63}" type="datetimeFigureOut">
               <a:rPr lang="pt-BR" smtClean="0"/>
-              <a:t>04/06/2022</a:t>
+              <a:t>20/06/2022</a:t>
             </a:fld>
             <a:endParaRPr lang="pt-BR"/>
           </a:p>
@@ -4735,7 +4735,7 @@
           <a:p>
             <a:fld id="{E4EBD666-A697-4156-91FF-DAAB2B063E63}" type="datetimeFigureOut">
               <a:rPr lang="pt-BR" smtClean="0"/>
-              <a:t>04/06/2022</a:t>
+              <a:t>20/06/2022</a:t>
             </a:fld>
             <a:endParaRPr lang="pt-BR"/>
           </a:p>
@@ -5040,7 +5040,7 @@
           <a:p>
             <a:fld id="{E4EBD666-A697-4156-91FF-DAAB2B063E63}" type="datetimeFigureOut">
               <a:rPr lang="pt-BR" smtClean="0"/>
-              <a:t>04/06/2022</a:t>
+              <a:t>20/06/2022</a:t>
             </a:fld>
             <a:endParaRPr lang="pt-BR"/>
           </a:p>
@@ -5351,7 +5351,7 @@
           <a:p>
             <a:fld id="{E4EBD666-A697-4156-91FF-DAAB2B063E63}" type="datetimeFigureOut">
               <a:rPr lang="pt-BR" smtClean="0"/>
-              <a:t>04/06/2022</a:t>
+              <a:t>20/06/2022</a:t>
             </a:fld>
             <a:endParaRPr lang="pt-BR"/>
           </a:p>
@@ -5639,7 +5639,7 @@
           <a:p>
             <a:fld id="{E4EBD666-A697-4156-91FF-DAAB2B063E63}" type="datetimeFigureOut">
               <a:rPr lang="pt-BR" smtClean="0"/>
-              <a:t>04/06/2022</a:t>
+              <a:t>20/06/2022</a:t>
             </a:fld>
             <a:endParaRPr lang="pt-BR"/>
           </a:p>
@@ -5837,7 +5837,7 @@
           <a:p>
             <a:fld id="{E4EBD666-A697-4156-91FF-DAAB2B063E63}" type="datetimeFigureOut">
               <a:rPr lang="pt-BR" smtClean="0"/>
-              <a:t>04/06/2022</a:t>
+              <a:t>20/06/2022</a:t>
             </a:fld>
             <a:endParaRPr lang="pt-BR"/>
           </a:p>
@@ -6045,7 +6045,7 @@
           <a:p>
             <a:fld id="{E4EBD666-A697-4156-91FF-DAAB2B063E63}" type="datetimeFigureOut">
               <a:rPr lang="pt-BR" smtClean="0"/>
-              <a:t>04/06/2022</a:t>
+              <a:t>20/06/2022</a:t>
             </a:fld>
             <a:endParaRPr lang="pt-BR"/>
           </a:p>
@@ -7759,7 +7759,7 @@
           <a:p>
             <a:fld id="{722B080F-126B-4C40-8493-979CF4E35B37}" type="datetimeFigureOut">
               <a:rPr lang="pt-BR" smtClean="0"/>
-              <a:t>04/06/2022</a:t>
+              <a:t>20/06/2022</a:t>
             </a:fld>
             <a:endParaRPr lang="pt-BR"/>
           </a:p>
@@ -8330,7 +8330,7 @@
           <a:p>
             <a:fld id="{E4EBD666-A697-4156-91FF-DAAB2B063E63}" type="datetimeFigureOut">
               <a:rPr lang="pt-BR" smtClean="0"/>
-              <a:t>04/06/2022</a:t>
+              <a:t>20/06/2022</a:t>
             </a:fld>
             <a:endParaRPr lang="pt-BR"/>
           </a:p>
@@ -13515,8 +13515,8 @@
         </p:nvSpPr>
         <p:spPr>
           <a:xfrm>
-            <a:off x="2869285" y="3739272"/>
-            <a:ext cx="1851558" cy="276999"/>
+            <a:off x="2869285" y="3596659"/>
+            <a:ext cx="1851558" cy="461665"/>
           </a:xfrm>
           <a:prstGeom prst="rect">
             <a:avLst/>
@@ -13538,7 +13538,20 @@
                 <a:latin typeface="Arial" panose="020B0604020202020204" pitchFamily="34" charset="0"/>
                 <a:cs typeface="Arial" panose="020B0604020202020204" pitchFamily="34" charset="0"/>
               </a:rPr>
-              <a:t>Não se aplica</a:t>
+              <a:t>Notebook/laptop</a:t>
+            </a:r>
+          </a:p>
+          <a:p>
+            <a:pPr algn="ctr"/>
+            <a:r>
+              <a:rPr lang="pt-BR" sz="1200" dirty="0">
+                <a:solidFill>
+                  <a:schemeClr val="bg1"/>
+                </a:solidFill>
+                <a:latin typeface="Arial" panose="020B0604020202020204" pitchFamily="34" charset="0"/>
+                <a:cs typeface="Arial" panose="020B0604020202020204" pitchFamily="34" charset="0"/>
+              </a:rPr>
+              <a:t>Computador</a:t>
             </a:r>
             <a:endParaRPr lang="pt-BR" sz="900" dirty="0">
               <a:solidFill>

</xml_diff>